<commit_message>
updated schematic source files
</commit_message>
<xml_diff>
--- a/assets/images/citylearn_systems.pptx
+++ b/assets/images/citylearn_systems.pptx
@@ -255,7 +255,7 @@
           <a:p>
             <a:fld id="{C375809C-1078-40E5-8D78-A06230988E2D}" type="datetimeFigureOut">
               <a:rPr lang="en-US" smtClean="0"/>
-              <a:t>3/20/23</a:t>
+              <a:t>3/24/23</a:t>
             </a:fld>
             <a:endParaRPr lang="en-US"/>
           </a:p>
@@ -433,7 +433,7 @@
             <a:fld id="{2B843C7C-BC90-49F1-B4F6-A48532280559}" type="datetimeFigureOut">
               <a:rPr lang="de-DE" smtClean="0"/>
               <a:pPr/>
-              <a:t>20.03.23</a:t>
+              <a:t>24.03.23</a:t>
             </a:fld>
             <a:endParaRPr lang="de-DE"/>
           </a:p>
@@ -3806,7 +3806,7 @@
             <a:pPr algn="ctr"/>
             <a:r>
               <a:rPr lang="en-US" sz="1600" b="1" dirty="0"/>
-              <a:t>Building N </a:t>
+              <a:t>Building 1 </a:t>
             </a:r>
           </a:p>
         </p:txBody>
@@ -4550,7 +4550,7 @@
                     <a:schemeClr val="bg1"/>
                   </a:solidFill>
                 </a:rPr>
-                <a:t>Agent</a:t>
+                <a:t>Agent N</a:t>
               </a:r>
             </a:p>
           </p:txBody>
@@ -5187,7 +5187,7 @@
         <p:spPr>
           <a:xfrm>
             <a:off x="4511824" y="4346470"/>
-            <a:ext cx="1296144" cy="600164"/>
+            <a:ext cx="1296144" cy="430887"/>
           </a:xfrm>
           <a:prstGeom prst="rect">
             <a:avLst/>
@@ -5209,7 +5209,7 @@
                   </a:schemeClr>
                 </a:solidFill>
               </a:rPr>
-              <a:t>Domestic hot water and/or space heating storage</a:t>
+              <a:t>Domestic hot water  heating storage</a:t>
             </a:r>
           </a:p>
         </p:txBody>
@@ -5342,10 +5342,10 @@
       </p:sp>
       <p:sp>
         <p:nvSpPr>
-          <p:cNvPr id="21" name="TextBox 20">
-            <a:extLst>
-              <a:ext uri="{FF2B5EF4-FFF2-40B4-BE49-F238E27FC236}">
-                <a16:creationId xmlns:a16="http://schemas.microsoft.com/office/drawing/2014/main" id="{9646944C-E545-CC65-C376-35CE2B679906}"/>
+          <p:cNvPr id="35" name="TextBox 34">
+            <a:extLst>
+              <a:ext uri="{FF2B5EF4-FFF2-40B4-BE49-F238E27FC236}">
+                <a16:creationId xmlns:a16="http://schemas.microsoft.com/office/drawing/2014/main" id="{C7FA50B3-91A7-8B9A-3D20-AD2E9C97EF1A}"/>
               </a:ext>
             </a:extLst>
           </p:cNvPr>
@@ -5354,8 +5354,8 @@
         </p:nvSpPr>
         <p:spPr>
           <a:xfrm>
-            <a:off x="6599332" y="2359913"/>
-            <a:ext cx="1008837" cy="276999"/>
+            <a:off x="5074327" y="1063768"/>
+            <a:ext cx="1567954" cy="338554"/>
           </a:xfrm>
           <a:prstGeom prst="rect">
             <a:avLst/>
@@ -5370,87 +5370,8 @@
           <a:p>
             <a:pPr algn="ctr"/>
             <a:r>
-              <a:rPr lang="en-US" sz="1200" b="1" dirty="0"/>
-              <a:t>Power</a:t>
-            </a:r>
-          </a:p>
-        </p:txBody>
-      </p:sp>
-      <p:cxnSp>
-        <p:nvCxnSpPr>
-          <p:cNvPr id="24" name="Straight Arrow Connector 23">
-            <a:extLst>
-              <a:ext uri="{FF2B5EF4-FFF2-40B4-BE49-F238E27FC236}">
-                <a16:creationId xmlns:a16="http://schemas.microsoft.com/office/drawing/2014/main" id="{2331EED1-A828-CDC3-1182-038326048AE0}"/>
-              </a:ext>
-            </a:extLst>
-          </p:cNvPr>
-          <p:cNvCxnSpPr>
-            <a:cxnSpLocks/>
-            <a:stCxn id="58" idx="0"/>
-            <a:endCxn id="46" idx="3"/>
-          </p:cNvCxnSpPr>
-          <p:nvPr/>
-        </p:nvCxnSpPr>
-        <p:spPr>
-          <a:xfrm rot="16200000" flipV="1">
-            <a:off x="6871924" y="2351748"/>
-            <a:ext cx="797913" cy="1378657"/>
-          </a:xfrm>
-          <a:prstGeom prst="bentConnector2">
-            <a:avLst/>
-          </a:prstGeom>
-          <a:ln w="28575">
-            <a:tailEnd type="triangle"/>
-          </a:ln>
-        </p:spPr>
-        <p:style>
-          <a:lnRef idx="1">
-            <a:schemeClr val="dk1"/>
-          </a:lnRef>
-          <a:fillRef idx="0">
-            <a:schemeClr val="dk1"/>
-          </a:fillRef>
-          <a:effectRef idx="0">
-            <a:schemeClr val="dk1"/>
-          </a:effectRef>
-          <a:fontRef idx="minor">
-            <a:schemeClr val="tx1"/>
-          </a:fontRef>
-        </p:style>
-      </p:cxnSp>
-      <p:sp>
-        <p:nvSpPr>
-          <p:cNvPr id="35" name="TextBox 34">
-            <a:extLst>
-              <a:ext uri="{FF2B5EF4-FFF2-40B4-BE49-F238E27FC236}">
-                <a16:creationId xmlns:a16="http://schemas.microsoft.com/office/drawing/2014/main" id="{C7FA50B3-91A7-8B9A-3D20-AD2E9C97EF1A}"/>
-              </a:ext>
-            </a:extLst>
-          </p:cNvPr>
-          <p:cNvSpPr txBox="1"/>
-          <p:nvPr/>
-        </p:nvSpPr>
-        <p:spPr>
-          <a:xfrm>
-            <a:off x="5074327" y="1063768"/>
-            <a:ext cx="1567954" cy="338554"/>
-          </a:xfrm>
-          <a:prstGeom prst="rect">
-            <a:avLst/>
-          </a:prstGeom>
-          <a:noFill/>
-        </p:spPr>
-        <p:txBody>
-          <a:bodyPr wrap="square" rtlCol="0">
-            <a:spAutoFit/>
-          </a:bodyPr>
-          <a:lstStyle/>
-          <a:p>
-            <a:pPr algn="ctr"/>
-            <a:r>
               <a:rPr lang="en-US" sz="1600" b="1" dirty="0"/>
-              <a:t>Building 1</a:t>
+              <a:t>Building N</a:t>
             </a:r>
           </a:p>
         </p:txBody>
@@ -5487,10 +5408,10 @@
       </p:grpSpPr>
       <p:pic>
         <p:nvPicPr>
-          <p:cNvPr id="2" name="Picture 1">
-            <a:extLst>
-              <a:ext uri="{FF2B5EF4-FFF2-40B4-BE49-F238E27FC236}">
-                <a16:creationId xmlns:a16="http://schemas.microsoft.com/office/drawing/2014/main" id="{ED7714F7-D8C6-E1C1-EA3B-684CCB0824A6}"/>
+          <p:cNvPr id="3" name="Picture 2">
+            <a:extLst>
+              <a:ext uri="{FF2B5EF4-FFF2-40B4-BE49-F238E27FC236}">
+                <a16:creationId xmlns:a16="http://schemas.microsoft.com/office/drawing/2014/main" id="{54F0E7B7-7764-5D78-5ADB-3FB3DCAA5D20}"/>
               </a:ext>
             </a:extLst>
           </p:cNvPr>
@@ -9297,8 +9218,8 @@
         </p:nvCxnSpPr>
         <p:spPr>
           <a:xfrm flipH="1">
-            <a:off x="7670465" y="1782214"/>
-            <a:ext cx="947849" cy="3217"/>
+            <a:off x="7670466" y="1782214"/>
+            <a:ext cx="947848" cy="3510"/>
           </a:xfrm>
           <a:prstGeom prst="straightConnector1">
             <a:avLst/>
@@ -9339,9 +9260,9 @@
           <p:nvPr/>
         </p:nvCxnSpPr>
         <p:spPr>
-          <a:xfrm>
-            <a:off x="7257473" y="2198423"/>
-            <a:ext cx="0" cy="477411"/>
+          <a:xfrm flipH="1">
+            <a:off x="7257473" y="2198716"/>
+            <a:ext cx="1" cy="477118"/>
           </a:xfrm>
           <a:prstGeom prst="straightConnector1">
             <a:avLst/>
@@ -9898,7 +9819,7 @@
         <p:spPr>
           <a:xfrm>
             <a:off x="6252891" y="1782214"/>
-            <a:ext cx="591589" cy="3217"/>
+            <a:ext cx="591590" cy="3510"/>
           </a:xfrm>
           <a:prstGeom prst="straightConnector1">
             <a:avLst/>
@@ -10551,7 +10472,7 @@
         </p:blipFill>
         <p:spPr>
           <a:xfrm>
-            <a:off x="7060504" y="1408153"/>
+            <a:off x="11356365" y="252879"/>
             <a:ext cx="464842" cy="220335"/>
           </a:xfrm>
           <a:prstGeom prst="rect">
@@ -10587,7 +10508,7 @@
         </p:blipFill>
         <p:spPr>
           <a:xfrm>
-            <a:off x="6844480" y="1372438"/>
+            <a:off x="6844481" y="1372731"/>
             <a:ext cx="825985" cy="825985"/>
           </a:xfrm>
           <a:prstGeom prst="rect">
@@ -10612,7 +10533,7 @@
         </p:nvCxnSpPr>
         <p:spPr>
           <a:xfrm>
-            <a:off x="7257473" y="1187309"/>
+            <a:off x="7257474" y="1187602"/>
             <a:ext cx="0" cy="185129"/>
           </a:xfrm>
           <a:prstGeom prst="straightConnector1">
@@ -11317,10 +11238,10 @@
       </p:grpSpPr>
       <p:pic>
         <p:nvPicPr>
-          <p:cNvPr id="7" name="Picture 6">
-            <a:extLst>
-              <a:ext uri="{FF2B5EF4-FFF2-40B4-BE49-F238E27FC236}">
-                <a16:creationId xmlns:a16="http://schemas.microsoft.com/office/drawing/2014/main" id="{883A036A-1E44-3D9B-6B79-F078260A1528}"/>
+          <p:cNvPr id="2" name="Picture 1">
+            <a:extLst>
+              <a:ext uri="{FF2B5EF4-FFF2-40B4-BE49-F238E27FC236}">
+                <a16:creationId xmlns:a16="http://schemas.microsoft.com/office/drawing/2014/main" id="{AE666E81-A703-8369-1FD1-C4046468FA34}"/>
               </a:ext>
             </a:extLst>
           </p:cNvPr>

</xml_diff>